<commit_message>
final draft of slide deck and ppt
</commit_message>
<xml_diff>
--- a/deliverables/league_final.pptx
+++ b/deliverables/league_final.pptx
@@ -4,6 +4,9 @@
   <p:sldMasterIdLst>
     <p:sldMasterId id="2147483648" r:id="rId1"/>
   </p:sldMasterIdLst>
+  <p:notesMasterIdLst>
+    <p:notesMasterId r:id="rId15"/>
+  </p:notesMasterIdLst>
   <p:sldIdLst>
     <p:sldId id="258" r:id="rId2"/>
     <p:sldId id="260" r:id="rId3"/>
@@ -122,6 +125,951 @@
     </p:ext>
   </p:extLst>
 </p:presentation>
+</file>
+
+<file path=ppt/notesMasters/notesMaster1.xml><?xml version="1.0" encoding="utf-8"?>
+<p:notesMaster xmlns:a="http://schemas.openxmlformats.org/drawingml/2006/main" xmlns:r="http://schemas.openxmlformats.org/officeDocument/2006/relationships" xmlns:p="http://schemas.openxmlformats.org/presentationml/2006/main">
+  <p:cSld>
+    <p:bg>
+      <p:bgRef idx="1001">
+        <a:schemeClr val="bg1"/>
+      </p:bgRef>
+    </p:bg>
+    <p:spTree>
+      <p:nvGrpSpPr>
+        <p:cNvPr id="1" name=""/>
+        <p:cNvGrpSpPr/>
+        <p:nvPr/>
+      </p:nvGrpSpPr>
+      <p:grpSpPr>
+        <a:xfrm>
+          <a:off x="0" y="0"/>
+          <a:ext cx="0" cy="0"/>
+          <a:chOff x="0" y="0"/>
+          <a:chExt cx="0" cy="0"/>
+        </a:xfrm>
+      </p:grpSpPr>
+      <p:sp>
+        <p:nvSpPr>
+          <p:cNvPr id="2" name="Header Placeholder 1"/>
+          <p:cNvSpPr>
+            <a:spLocks noGrp="1"/>
+          </p:cNvSpPr>
+          <p:nvPr>
+            <p:ph type="hdr" sz="quarter"/>
+          </p:nvPr>
+        </p:nvSpPr>
+        <p:spPr>
+          <a:xfrm>
+            <a:off x="0" y="0"/>
+            <a:ext cx="2971800" cy="458788"/>
+          </a:xfrm>
+          <a:prstGeom prst="rect">
+            <a:avLst/>
+          </a:prstGeom>
+        </p:spPr>
+        <p:txBody>
+          <a:bodyPr vert="horz" lIns="91440" tIns="45720" rIns="91440" bIns="45720" rtlCol="0"/>
+          <a:lstStyle>
+            <a:lvl1pPr algn="l">
+              <a:defRPr sz="1200"/>
+            </a:lvl1pPr>
+          </a:lstStyle>
+          <a:p>
+            <a:endParaRPr lang="en-US"/>
+          </a:p>
+        </p:txBody>
+      </p:sp>
+      <p:sp>
+        <p:nvSpPr>
+          <p:cNvPr id="3" name="Date Placeholder 2"/>
+          <p:cNvSpPr>
+            <a:spLocks noGrp="1"/>
+          </p:cNvSpPr>
+          <p:nvPr>
+            <p:ph type="dt" idx="1"/>
+          </p:nvPr>
+        </p:nvSpPr>
+        <p:spPr>
+          <a:xfrm>
+            <a:off x="3884613" y="0"/>
+            <a:ext cx="2971800" cy="458788"/>
+          </a:xfrm>
+          <a:prstGeom prst="rect">
+            <a:avLst/>
+          </a:prstGeom>
+        </p:spPr>
+        <p:txBody>
+          <a:bodyPr vert="horz" lIns="91440" tIns="45720" rIns="91440" bIns="45720" rtlCol="0"/>
+          <a:lstStyle>
+            <a:lvl1pPr algn="r">
+              <a:defRPr sz="1200"/>
+            </a:lvl1pPr>
+          </a:lstStyle>
+          <a:p>
+            <a:fld id="{C0CC0700-89CD-4A62-A22F-2F87FE8D39DF}" type="datetimeFigureOut">
+              <a:rPr lang="en-US" smtClean="0"/>
+              <a:t>10/29/2021</a:t>
+            </a:fld>
+            <a:endParaRPr lang="en-US"/>
+          </a:p>
+        </p:txBody>
+      </p:sp>
+      <p:sp>
+        <p:nvSpPr>
+          <p:cNvPr id="4" name="Slide Image Placeholder 3"/>
+          <p:cNvSpPr>
+            <a:spLocks noGrp="1" noRot="1" noChangeAspect="1"/>
+          </p:cNvSpPr>
+          <p:nvPr>
+            <p:ph type="sldImg" idx="2"/>
+          </p:nvPr>
+        </p:nvSpPr>
+        <p:spPr>
+          <a:xfrm>
+            <a:off x="685800" y="1143000"/>
+            <a:ext cx="5486400" cy="3086100"/>
+          </a:xfrm>
+          <a:prstGeom prst="rect">
+            <a:avLst/>
+          </a:prstGeom>
+          <a:noFill/>
+          <a:ln w="12700">
+            <a:solidFill>
+              <a:prstClr val="black"/>
+            </a:solidFill>
+          </a:ln>
+        </p:spPr>
+        <p:txBody>
+          <a:bodyPr vert="horz" lIns="91440" tIns="45720" rIns="91440" bIns="45720" rtlCol="0" anchor="ctr"/>
+          <a:lstStyle/>
+          <a:p>
+            <a:endParaRPr lang="en-US"/>
+          </a:p>
+        </p:txBody>
+      </p:sp>
+      <p:sp>
+        <p:nvSpPr>
+          <p:cNvPr id="5" name="Notes Placeholder 4"/>
+          <p:cNvSpPr>
+            <a:spLocks noGrp="1"/>
+          </p:cNvSpPr>
+          <p:nvPr>
+            <p:ph type="body" sz="quarter" idx="3"/>
+          </p:nvPr>
+        </p:nvSpPr>
+        <p:spPr>
+          <a:xfrm>
+            <a:off x="685800" y="4400550"/>
+            <a:ext cx="5486400" cy="3600450"/>
+          </a:xfrm>
+          <a:prstGeom prst="rect">
+            <a:avLst/>
+          </a:prstGeom>
+        </p:spPr>
+        <p:txBody>
+          <a:bodyPr vert="horz" lIns="91440" tIns="45720" rIns="91440" bIns="45720" rtlCol="0"/>
+          <a:lstStyle/>
+          <a:p>
+            <a:pPr lvl="0"/>
+            <a:r>
+              <a:rPr lang="en-US"/>
+              <a:t>Click to edit Master text styles</a:t>
+            </a:r>
+          </a:p>
+          <a:p>
+            <a:pPr lvl="1"/>
+            <a:r>
+              <a:rPr lang="en-US"/>
+              <a:t>Second level</a:t>
+            </a:r>
+          </a:p>
+          <a:p>
+            <a:pPr lvl="2"/>
+            <a:r>
+              <a:rPr lang="en-US"/>
+              <a:t>Third level</a:t>
+            </a:r>
+          </a:p>
+          <a:p>
+            <a:pPr lvl="3"/>
+            <a:r>
+              <a:rPr lang="en-US"/>
+              <a:t>Fourth level</a:t>
+            </a:r>
+          </a:p>
+          <a:p>
+            <a:pPr lvl="4"/>
+            <a:r>
+              <a:rPr lang="en-US"/>
+              <a:t>Fifth level</a:t>
+            </a:r>
+          </a:p>
+        </p:txBody>
+      </p:sp>
+      <p:sp>
+        <p:nvSpPr>
+          <p:cNvPr id="6" name="Footer Placeholder 5"/>
+          <p:cNvSpPr>
+            <a:spLocks noGrp="1"/>
+          </p:cNvSpPr>
+          <p:nvPr>
+            <p:ph type="ftr" sz="quarter" idx="4"/>
+          </p:nvPr>
+        </p:nvSpPr>
+        <p:spPr>
+          <a:xfrm>
+            <a:off x="0" y="8685213"/>
+            <a:ext cx="2971800" cy="458787"/>
+          </a:xfrm>
+          <a:prstGeom prst="rect">
+            <a:avLst/>
+          </a:prstGeom>
+        </p:spPr>
+        <p:txBody>
+          <a:bodyPr vert="horz" lIns="91440" tIns="45720" rIns="91440" bIns="45720" rtlCol="0" anchor="b"/>
+          <a:lstStyle>
+            <a:lvl1pPr algn="l">
+              <a:defRPr sz="1200"/>
+            </a:lvl1pPr>
+          </a:lstStyle>
+          <a:p>
+            <a:endParaRPr lang="en-US"/>
+          </a:p>
+        </p:txBody>
+      </p:sp>
+      <p:sp>
+        <p:nvSpPr>
+          <p:cNvPr id="7" name="Slide Number Placeholder 6"/>
+          <p:cNvSpPr>
+            <a:spLocks noGrp="1"/>
+          </p:cNvSpPr>
+          <p:nvPr>
+            <p:ph type="sldNum" sz="quarter" idx="5"/>
+          </p:nvPr>
+        </p:nvSpPr>
+        <p:spPr>
+          <a:xfrm>
+            <a:off x="3884613" y="8685213"/>
+            <a:ext cx="2971800" cy="458787"/>
+          </a:xfrm>
+          <a:prstGeom prst="rect">
+            <a:avLst/>
+          </a:prstGeom>
+        </p:spPr>
+        <p:txBody>
+          <a:bodyPr vert="horz" lIns="91440" tIns="45720" rIns="91440" bIns="45720" rtlCol="0" anchor="b"/>
+          <a:lstStyle>
+            <a:lvl1pPr algn="r">
+              <a:defRPr sz="1200"/>
+            </a:lvl1pPr>
+          </a:lstStyle>
+          <a:p>
+            <a:fld id="{2F59C3BC-FB11-4182-87E9-62129BAA115E}" type="slidenum">
+              <a:rPr lang="en-US" smtClean="0"/>
+              <a:t>‹#›</a:t>
+            </a:fld>
+            <a:endParaRPr lang="en-US"/>
+          </a:p>
+        </p:txBody>
+      </p:sp>
+    </p:spTree>
+    <p:extLst>
+      <p:ext uri="{BB962C8B-B14F-4D97-AF65-F5344CB8AC3E}">
+        <p14:creationId xmlns:p14="http://schemas.microsoft.com/office/powerpoint/2010/main" val="1798914235"/>
+      </p:ext>
+    </p:extLst>
+  </p:cSld>
+  <p:clrMap bg1="lt1" tx1="dk1" bg2="lt2" tx2="dk2" accent1="accent1" accent2="accent2" accent3="accent3" accent4="accent4" accent5="accent5" accent6="accent6" hlink="hlink" folHlink="folHlink"/>
+  <p:notesStyle>
+    <a:lvl1pPr marL="0" algn="l" defTabSz="914400" rtl="0" eaLnBrk="1" latinLnBrk="0" hangingPunct="1">
+      <a:defRPr sz="1200" kern="1200">
+        <a:solidFill>
+          <a:schemeClr val="tx1"/>
+        </a:solidFill>
+        <a:latin typeface="+mn-lt"/>
+        <a:ea typeface="+mn-ea"/>
+        <a:cs typeface="+mn-cs"/>
+      </a:defRPr>
+    </a:lvl1pPr>
+    <a:lvl2pPr marL="457200" algn="l" defTabSz="914400" rtl="0" eaLnBrk="1" latinLnBrk="0" hangingPunct="1">
+      <a:defRPr sz="1200" kern="1200">
+        <a:solidFill>
+          <a:schemeClr val="tx1"/>
+        </a:solidFill>
+        <a:latin typeface="+mn-lt"/>
+        <a:ea typeface="+mn-ea"/>
+        <a:cs typeface="+mn-cs"/>
+      </a:defRPr>
+    </a:lvl2pPr>
+    <a:lvl3pPr marL="914400" algn="l" defTabSz="914400" rtl="0" eaLnBrk="1" latinLnBrk="0" hangingPunct="1">
+      <a:defRPr sz="1200" kern="1200">
+        <a:solidFill>
+          <a:schemeClr val="tx1"/>
+        </a:solidFill>
+        <a:latin typeface="+mn-lt"/>
+        <a:ea typeface="+mn-ea"/>
+        <a:cs typeface="+mn-cs"/>
+      </a:defRPr>
+    </a:lvl3pPr>
+    <a:lvl4pPr marL="1371600" algn="l" defTabSz="914400" rtl="0" eaLnBrk="1" latinLnBrk="0" hangingPunct="1">
+      <a:defRPr sz="1200" kern="1200">
+        <a:solidFill>
+          <a:schemeClr val="tx1"/>
+        </a:solidFill>
+        <a:latin typeface="+mn-lt"/>
+        <a:ea typeface="+mn-ea"/>
+        <a:cs typeface="+mn-cs"/>
+      </a:defRPr>
+    </a:lvl4pPr>
+    <a:lvl5pPr marL="1828800" algn="l" defTabSz="914400" rtl="0" eaLnBrk="1" latinLnBrk="0" hangingPunct="1">
+      <a:defRPr sz="1200" kern="1200">
+        <a:solidFill>
+          <a:schemeClr val="tx1"/>
+        </a:solidFill>
+        <a:latin typeface="+mn-lt"/>
+        <a:ea typeface="+mn-ea"/>
+        <a:cs typeface="+mn-cs"/>
+      </a:defRPr>
+    </a:lvl5pPr>
+    <a:lvl6pPr marL="2286000" algn="l" defTabSz="914400" rtl="0" eaLnBrk="1" latinLnBrk="0" hangingPunct="1">
+      <a:defRPr sz="1200" kern="1200">
+        <a:solidFill>
+          <a:schemeClr val="tx1"/>
+        </a:solidFill>
+        <a:latin typeface="+mn-lt"/>
+        <a:ea typeface="+mn-ea"/>
+        <a:cs typeface="+mn-cs"/>
+      </a:defRPr>
+    </a:lvl6pPr>
+    <a:lvl7pPr marL="2743200" algn="l" defTabSz="914400" rtl="0" eaLnBrk="1" latinLnBrk="0" hangingPunct="1">
+      <a:defRPr sz="1200" kern="1200">
+        <a:solidFill>
+          <a:schemeClr val="tx1"/>
+        </a:solidFill>
+        <a:latin typeface="+mn-lt"/>
+        <a:ea typeface="+mn-ea"/>
+        <a:cs typeface="+mn-cs"/>
+      </a:defRPr>
+    </a:lvl7pPr>
+    <a:lvl8pPr marL="3200400" algn="l" defTabSz="914400" rtl="0" eaLnBrk="1" latinLnBrk="0" hangingPunct="1">
+      <a:defRPr sz="1200" kern="1200">
+        <a:solidFill>
+          <a:schemeClr val="tx1"/>
+        </a:solidFill>
+        <a:latin typeface="+mn-lt"/>
+        <a:ea typeface="+mn-ea"/>
+        <a:cs typeface="+mn-cs"/>
+      </a:defRPr>
+    </a:lvl8pPr>
+    <a:lvl9pPr marL="3657600" algn="l" defTabSz="914400" rtl="0" eaLnBrk="1" latinLnBrk="0" hangingPunct="1">
+      <a:defRPr sz="1200" kern="1200">
+        <a:solidFill>
+          <a:schemeClr val="tx1"/>
+        </a:solidFill>
+        <a:latin typeface="+mn-lt"/>
+        <a:ea typeface="+mn-ea"/>
+        <a:cs typeface="+mn-cs"/>
+      </a:defRPr>
+    </a:lvl9pPr>
+  </p:notesStyle>
+</p:notesMaster>
+</file>
+
+<file path=ppt/notesSlides/notesSlide1.xml><?xml version="1.0" encoding="utf-8"?>
+<p:notes xmlns:a="http://schemas.openxmlformats.org/drawingml/2006/main" xmlns:r="http://schemas.openxmlformats.org/officeDocument/2006/relationships" xmlns:p="http://schemas.openxmlformats.org/presentationml/2006/main">
+  <p:cSld>
+    <p:spTree>
+      <p:nvGrpSpPr>
+        <p:cNvPr id="1" name=""/>
+        <p:cNvGrpSpPr/>
+        <p:nvPr/>
+      </p:nvGrpSpPr>
+      <p:grpSpPr>
+        <a:xfrm>
+          <a:off x="0" y="0"/>
+          <a:ext cx="0" cy="0"/>
+          <a:chOff x="0" y="0"/>
+          <a:chExt cx="0" cy="0"/>
+        </a:xfrm>
+      </p:grpSpPr>
+      <p:sp>
+        <p:nvSpPr>
+          <p:cNvPr id="2" name="Slide Image Placeholder 1"/>
+          <p:cNvSpPr>
+            <a:spLocks noGrp="1" noRot="1" noChangeAspect="1"/>
+          </p:cNvSpPr>
+          <p:nvPr>
+            <p:ph type="sldImg"/>
+          </p:nvPr>
+        </p:nvSpPr>
+        <p:spPr/>
+      </p:sp>
+      <p:sp>
+        <p:nvSpPr>
+          <p:cNvPr id="3" name="Notes Placeholder 2"/>
+          <p:cNvSpPr>
+            <a:spLocks noGrp="1"/>
+          </p:cNvSpPr>
+          <p:nvPr>
+            <p:ph type="body" idx="1"/>
+          </p:nvPr>
+        </p:nvSpPr>
+        <p:spPr/>
+        <p:txBody>
+          <a:bodyPr/>
+          <a:lstStyle/>
+          <a:p>
+            <a:r>
+              <a:rPr lang="en-US" dirty="0"/>
+              <a:t>-how big it is, 115 million</a:t>
+            </a:r>
+          </a:p>
+          <a:p>
+            <a:r>
+              <a:rPr lang="en-US" dirty="0"/>
+              <a:t>-similarly as an </a:t>
+            </a:r>
+            <a:r>
+              <a:rPr lang="en-US" dirty="0" err="1"/>
+              <a:t>esport</a:t>
+            </a:r>
+            <a:r>
+              <a:rPr lang="en-US" dirty="0"/>
+              <a:t> growth over past 10 years, compare to super bowl</a:t>
+            </a:r>
+          </a:p>
+          <a:p>
+            <a:r>
+              <a:rPr lang="en-US" dirty="0"/>
+              <a:t>- Provide another tool in the tool shed of casting team to analyze games</a:t>
+            </a:r>
+          </a:p>
+          <a:p>
+            <a:endParaRPr lang="en-US" dirty="0"/>
+          </a:p>
+          <a:p>
+            <a:r>
+              <a:rPr lang="en-US" dirty="0"/>
+              <a:t>try to hit in 1:15 minute</a:t>
+            </a:r>
+          </a:p>
+        </p:txBody>
+      </p:sp>
+      <p:sp>
+        <p:nvSpPr>
+          <p:cNvPr id="4" name="Slide Number Placeholder 3"/>
+          <p:cNvSpPr>
+            <a:spLocks noGrp="1"/>
+          </p:cNvSpPr>
+          <p:nvPr>
+            <p:ph type="sldNum" sz="quarter" idx="5"/>
+          </p:nvPr>
+        </p:nvSpPr>
+        <p:spPr/>
+        <p:txBody>
+          <a:bodyPr/>
+          <a:lstStyle/>
+          <a:p>
+            <a:fld id="{2F59C3BC-FB11-4182-87E9-62129BAA115E}" type="slidenum">
+              <a:rPr lang="en-US" smtClean="0"/>
+              <a:t>3</a:t>
+            </a:fld>
+            <a:endParaRPr lang="en-US"/>
+          </a:p>
+        </p:txBody>
+      </p:sp>
+    </p:spTree>
+    <p:extLst>
+      <p:ext uri="{BB962C8B-B14F-4D97-AF65-F5344CB8AC3E}">
+        <p14:creationId xmlns:p14="http://schemas.microsoft.com/office/powerpoint/2010/main" val="4082294912"/>
+      </p:ext>
+    </p:extLst>
+  </p:cSld>
+  <p:clrMapOvr>
+    <a:masterClrMapping/>
+  </p:clrMapOvr>
+</p:notes>
+</file>
+
+<file path=ppt/notesSlides/notesSlide2.xml><?xml version="1.0" encoding="utf-8"?>
+<p:notes xmlns:a="http://schemas.openxmlformats.org/drawingml/2006/main" xmlns:r="http://schemas.openxmlformats.org/officeDocument/2006/relationships" xmlns:p="http://schemas.openxmlformats.org/presentationml/2006/main">
+  <p:cSld>
+    <p:spTree>
+      <p:nvGrpSpPr>
+        <p:cNvPr id="1" name=""/>
+        <p:cNvGrpSpPr/>
+        <p:nvPr/>
+      </p:nvGrpSpPr>
+      <p:grpSpPr>
+        <a:xfrm>
+          <a:off x="0" y="0"/>
+          <a:ext cx="0" cy="0"/>
+          <a:chOff x="0" y="0"/>
+          <a:chExt cx="0" cy="0"/>
+        </a:xfrm>
+      </p:grpSpPr>
+      <p:sp>
+        <p:nvSpPr>
+          <p:cNvPr id="2" name="Slide Image Placeholder 1"/>
+          <p:cNvSpPr>
+            <a:spLocks noGrp="1" noRot="1" noChangeAspect="1"/>
+          </p:cNvSpPr>
+          <p:nvPr>
+            <p:ph type="sldImg"/>
+          </p:nvPr>
+        </p:nvSpPr>
+        <p:spPr/>
+      </p:sp>
+      <p:sp>
+        <p:nvSpPr>
+          <p:cNvPr id="3" name="Notes Placeholder 2"/>
+          <p:cNvSpPr>
+            <a:spLocks noGrp="1"/>
+          </p:cNvSpPr>
+          <p:nvPr>
+            <p:ph type="body" idx="1"/>
+          </p:nvPr>
+        </p:nvSpPr>
+        <p:spPr/>
+        <p:txBody>
+          <a:bodyPr/>
+          <a:lstStyle/>
+          <a:p>
+            <a:endParaRPr lang="en-US"/>
+          </a:p>
+        </p:txBody>
+      </p:sp>
+      <p:sp>
+        <p:nvSpPr>
+          <p:cNvPr id="4" name="Slide Number Placeholder 3"/>
+          <p:cNvSpPr>
+            <a:spLocks noGrp="1"/>
+          </p:cNvSpPr>
+          <p:nvPr>
+            <p:ph type="sldNum" sz="quarter" idx="5"/>
+          </p:nvPr>
+        </p:nvSpPr>
+        <p:spPr/>
+        <p:txBody>
+          <a:bodyPr/>
+          <a:lstStyle/>
+          <a:p>
+            <a:fld id="{2F59C3BC-FB11-4182-87E9-62129BAA115E}" type="slidenum">
+              <a:rPr lang="en-US" smtClean="0"/>
+              <a:t>4</a:t>
+            </a:fld>
+            <a:endParaRPr lang="en-US"/>
+          </a:p>
+        </p:txBody>
+      </p:sp>
+    </p:spTree>
+    <p:extLst>
+      <p:ext uri="{BB962C8B-B14F-4D97-AF65-F5344CB8AC3E}">
+        <p14:creationId xmlns:p14="http://schemas.microsoft.com/office/powerpoint/2010/main" val="2580464333"/>
+      </p:ext>
+    </p:extLst>
+  </p:cSld>
+  <p:clrMapOvr>
+    <a:masterClrMapping/>
+  </p:clrMapOvr>
+</p:notes>
+</file>
+
+<file path=ppt/notesSlides/notesSlide3.xml><?xml version="1.0" encoding="utf-8"?>
+<p:notes xmlns:a="http://schemas.openxmlformats.org/drawingml/2006/main" xmlns:r="http://schemas.openxmlformats.org/officeDocument/2006/relationships" xmlns:p="http://schemas.openxmlformats.org/presentationml/2006/main">
+  <p:cSld>
+    <p:spTree>
+      <p:nvGrpSpPr>
+        <p:cNvPr id="1" name=""/>
+        <p:cNvGrpSpPr/>
+        <p:nvPr/>
+      </p:nvGrpSpPr>
+      <p:grpSpPr>
+        <a:xfrm>
+          <a:off x="0" y="0"/>
+          <a:ext cx="0" cy="0"/>
+          <a:chOff x="0" y="0"/>
+          <a:chExt cx="0" cy="0"/>
+        </a:xfrm>
+      </p:grpSpPr>
+      <p:sp>
+        <p:nvSpPr>
+          <p:cNvPr id="2" name="Slide Image Placeholder 1"/>
+          <p:cNvSpPr>
+            <a:spLocks noGrp="1" noRot="1" noChangeAspect="1"/>
+          </p:cNvSpPr>
+          <p:nvPr>
+            <p:ph type="sldImg"/>
+          </p:nvPr>
+        </p:nvSpPr>
+        <p:spPr/>
+      </p:sp>
+      <p:sp>
+        <p:nvSpPr>
+          <p:cNvPr id="3" name="Notes Placeholder 2"/>
+          <p:cNvSpPr>
+            <a:spLocks noGrp="1"/>
+          </p:cNvSpPr>
+          <p:nvPr>
+            <p:ph type="body" idx="1"/>
+          </p:nvPr>
+        </p:nvSpPr>
+        <p:spPr/>
+        <p:txBody>
+          <a:bodyPr/>
+          <a:lstStyle/>
+          <a:p>
+            <a:r>
+              <a:rPr lang="en-US" dirty="0"/>
+              <a:t>- Quick overview of initial data</a:t>
+            </a:r>
+          </a:p>
+          <a:p>
+            <a:pPr marL="171450" indent="-171450">
+              <a:buFontTx/>
+              <a:buChar char="-"/>
+            </a:pPr>
+            <a:r>
+              <a:rPr lang="en-US" dirty="0"/>
+              <a:t>Feature selection/engineering</a:t>
+            </a:r>
+          </a:p>
+          <a:p>
+            <a:pPr marL="628650" lvl="1" indent="-171450">
+              <a:buFontTx/>
+              <a:buChar char="-"/>
+            </a:pPr>
+            <a:r>
+              <a:rPr lang="en-US" dirty="0"/>
+              <a:t>15 mins</a:t>
+            </a:r>
+          </a:p>
+          <a:p>
+            <a:pPr marL="628650" lvl="1" indent="-171450">
+              <a:buFontTx/>
+              <a:buChar char="-"/>
+            </a:pPr>
+            <a:endParaRPr lang="en-US" dirty="0"/>
+          </a:p>
+          <a:p>
+            <a:endParaRPr lang="en-US" dirty="0"/>
+          </a:p>
+        </p:txBody>
+      </p:sp>
+      <p:sp>
+        <p:nvSpPr>
+          <p:cNvPr id="4" name="Slide Number Placeholder 3"/>
+          <p:cNvSpPr>
+            <a:spLocks noGrp="1"/>
+          </p:cNvSpPr>
+          <p:nvPr>
+            <p:ph type="sldNum" sz="quarter" idx="5"/>
+          </p:nvPr>
+        </p:nvSpPr>
+        <p:spPr/>
+        <p:txBody>
+          <a:bodyPr/>
+          <a:lstStyle/>
+          <a:p>
+            <a:fld id="{2F59C3BC-FB11-4182-87E9-62129BAA115E}" type="slidenum">
+              <a:rPr lang="en-US" smtClean="0"/>
+              <a:t>5</a:t>
+            </a:fld>
+            <a:endParaRPr lang="en-US"/>
+          </a:p>
+        </p:txBody>
+      </p:sp>
+    </p:spTree>
+    <p:extLst>
+      <p:ext uri="{BB962C8B-B14F-4D97-AF65-F5344CB8AC3E}">
+        <p14:creationId xmlns:p14="http://schemas.microsoft.com/office/powerpoint/2010/main" val="3648887886"/>
+      </p:ext>
+    </p:extLst>
+  </p:cSld>
+  <p:clrMapOvr>
+    <a:masterClrMapping/>
+  </p:clrMapOvr>
+</p:notes>
+</file>
+
+<file path=ppt/notesSlides/notesSlide4.xml><?xml version="1.0" encoding="utf-8"?>
+<p:notes xmlns:a="http://schemas.openxmlformats.org/drawingml/2006/main" xmlns:r="http://schemas.openxmlformats.org/officeDocument/2006/relationships" xmlns:p="http://schemas.openxmlformats.org/presentationml/2006/main">
+  <p:cSld>
+    <p:spTree>
+      <p:nvGrpSpPr>
+        <p:cNvPr id="1" name=""/>
+        <p:cNvGrpSpPr/>
+        <p:nvPr/>
+      </p:nvGrpSpPr>
+      <p:grpSpPr>
+        <a:xfrm>
+          <a:off x="0" y="0"/>
+          <a:ext cx="0" cy="0"/>
+          <a:chOff x="0" y="0"/>
+          <a:chExt cx="0" cy="0"/>
+        </a:xfrm>
+      </p:grpSpPr>
+      <p:sp>
+        <p:nvSpPr>
+          <p:cNvPr id="2" name="Slide Image Placeholder 1"/>
+          <p:cNvSpPr>
+            <a:spLocks noGrp="1" noRot="1" noChangeAspect="1"/>
+          </p:cNvSpPr>
+          <p:nvPr>
+            <p:ph type="sldImg"/>
+          </p:nvPr>
+        </p:nvSpPr>
+        <p:spPr/>
+      </p:sp>
+      <p:sp>
+        <p:nvSpPr>
+          <p:cNvPr id="3" name="Notes Placeholder 2"/>
+          <p:cNvSpPr>
+            <a:spLocks noGrp="1"/>
+          </p:cNvSpPr>
+          <p:nvPr>
+            <p:ph type="body" idx="1"/>
+          </p:nvPr>
+        </p:nvSpPr>
+        <p:spPr/>
+        <p:txBody>
+          <a:bodyPr/>
+          <a:lstStyle/>
+          <a:p>
+            <a:r>
+              <a:rPr lang="en-US" dirty="0"/>
+              <a:t>Hit by 2:45</a:t>
+            </a:r>
+          </a:p>
+          <a:p>
+            <a:endParaRPr lang="en-US" dirty="0"/>
+          </a:p>
+          <a:p>
+            <a:r>
+              <a:rPr lang="en-US" dirty="0"/>
+              <a:t>Strengths of each model</a:t>
+            </a:r>
+          </a:p>
+          <a:p>
+            <a:endParaRPr lang="en-US" dirty="0"/>
+          </a:p>
+        </p:txBody>
+      </p:sp>
+      <p:sp>
+        <p:nvSpPr>
+          <p:cNvPr id="4" name="Slide Number Placeholder 3"/>
+          <p:cNvSpPr>
+            <a:spLocks noGrp="1"/>
+          </p:cNvSpPr>
+          <p:nvPr>
+            <p:ph type="sldNum" sz="quarter" idx="5"/>
+          </p:nvPr>
+        </p:nvSpPr>
+        <p:spPr/>
+        <p:txBody>
+          <a:bodyPr/>
+          <a:lstStyle/>
+          <a:p>
+            <a:fld id="{2F59C3BC-FB11-4182-87E9-62129BAA115E}" type="slidenum">
+              <a:rPr lang="en-US" smtClean="0"/>
+              <a:t>6</a:t>
+            </a:fld>
+            <a:endParaRPr lang="en-US"/>
+          </a:p>
+        </p:txBody>
+      </p:sp>
+    </p:spTree>
+    <p:extLst>
+      <p:ext uri="{BB962C8B-B14F-4D97-AF65-F5344CB8AC3E}">
+        <p14:creationId xmlns:p14="http://schemas.microsoft.com/office/powerpoint/2010/main" val="2583925749"/>
+      </p:ext>
+    </p:extLst>
+  </p:cSld>
+  <p:clrMapOvr>
+    <a:masterClrMapping/>
+  </p:clrMapOvr>
+</p:notes>
+</file>
+
+<file path=ppt/notesSlides/notesSlide5.xml><?xml version="1.0" encoding="utf-8"?>
+<p:notes xmlns:a="http://schemas.openxmlformats.org/drawingml/2006/main" xmlns:r="http://schemas.openxmlformats.org/officeDocument/2006/relationships" xmlns:p="http://schemas.openxmlformats.org/presentationml/2006/main">
+  <p:cSld>
+    <p:spTree>
+      <p:nvGrpSpPr>
+        <p:cNvPr id="1" name=""/>
+        <p:cNvGrpSpPr/>
+        <p:nvPr/>
+      </p:nvGrpSpPr>
+      <p:grpSpPr>
+        <a:xfrm>
+          <a:off x="0" y="0"/>
+          <a:ext cx="0" cy="0"/>
+          <a:chOff x="0" y="0"/>
+          <a:chExt cx="0" cy="0"/>
+        </a:xfrm>
+      </p:grpSpPr>
+      <p:sp>
+        <p:nvSpPr>
+          <p:cNvPr id="2" name="Slide Image Placeholder 1"/>
+          <p:cNvSpPr>
+            <a:spLocks noGrp="1" noRot="1" noChangeAspect="1"/>
+          </p:cNvSpPr>
+          <p:nvPr>
+            <p:ph type="sldImg"/>
+          </p:nvPr>
+        </p:nvSpPr>
+        <p:spPr/>
+      </p:sp>
+      <p:sp>
+        <p:nvSpPr>
+          <p:cNvPr id="3" name="Notes Placeholder 2"/>
+          <p:cNvSpPr>
+            <a:spLocks noGrp="1"/>
+          </p:cNvSpPr>
+          <p:nvPr>
+            <p:ph type="body" idx="1"/>
+          </p:nvPr>
+        </p:nvSpPr>
+        <p:spPr/>
+        <p:txBody>
+          <a:bodyPr/>
+          <a:lstStyle/>
+          <a:p>
+            <a:r>
+              <a:rPr lang="en-US" dirty="0"/>
+              <a:t>Hit by 4:15-4:30</a:t>
+            </a:r>
+          </a:p>
+        </p:txBody>
+      </p:sp>
+      <p:sp>
+        <p:nvSpPr>
+          <p:cNvPr id="4" name="Slide Number Placeholder 3"/>
+          <p:cNvSpPr>
+            <a:spLocks noGrp="1"/>
+          </p:cNvSpPr>
+          <p:nvPr>
+            <p:ph type="sldNum" sz="quarter" idx="5"/>
+          </p:nvPr>
+        </p:nvSpPr>
+        <p:spPr/>
+        <p:txBody>
+          <a:bodyPr/>
+          <a:lstStyle/>
+          <a:p>
+            <a:fld id="{2F59C3BC-FB11-4182-87E9-62129BAA115E}" type="slidenum">
+              <a:rPr lang="en-US" smtClean="0"/>
+              <a:t>8</a:t>
+            </a:fld>
+            <a:endParaRPr lang="en-US"/>
+          </a:p>
+        </p:txBody>
+      </p:sp>
+    </p:spTree>
+    <p:extLst>
+      <p:ext uri="{BB962C8B-B14F-4D97-AF65-F5344CB8AC3E}">
+        <p14:creationId xmlns:p14="http://schemas.microsoft.com/office/powerpoint/2010/main" val="764597800"/>
+      </p:ext>
+    </p:extLst>
+  </p:cSld>
+  <p:clrMapOvr>
+    <a:masterClrMapping/>
+  </p:clrMapOvr>
+</p:notes>
+</file>
+
+<file path=ppt/notesSlides/notesSlide6.xml><?xml version="1.0" encoding="utf-8"?>
+<p:notes xmlns:a="http://schemas.openxmlformats.org/drawingml/2006/main" xmlns:r="http://schemas.openxmlformats.org/officeDocument/2006/relationships" xmlns:p="http://schemas.openxmlformats.org/presentationml/2006/main">
+  <p:cSld>
+    <p:spTree>
+      <p:nvGrpSpPr>
+        <p:cNvPr id="1" name=""/>
+        <p:cNvGrpSpPr/>
+        <p:nvPr/>
+      </p:nvGrpSpPr>
+      <p:grpSpPr>
+        <a:xfrm>
+          <a:off x="0" y="0"/>
+          <a:ext cx="0" cy="0"/>
+          <a:chOff x="0" y="0"/>
+          <a:chExt cx="0" cy="0"/>
+        </a:xfrm>
+      </p:grpSpPr>
+      <p:sp>
+        <p:nvSpPr>
+          <p:cNvPr id="2" name="Slide Image Placeholder 1"/>
+          <p:cNvSpPr>
+            <a:spLocks noGrp="1" noRot="1" noChangeAspect="1"/>
+          </p:cNvSpPr>
+          <p:nvPr>
+            <p:ph type="sldImg"/>
+          </p:nvPr>
+        </p:nvSpPr>
+        <p:spPr/>
+      </p:sp>
+      <p:sp>
+        <p:nvSpPr>
+          <p:cNvPr id="3" name="Notes Placeholder 2"/>
+          <p:cNvSpPr>
+            <a:spLocks noGrp="1"/>
+          </p:cNvSpPr>
+          <p:nvPr>
+            <p:ph type="body" idx="1"/>
+          </p:nvPr>
+        </p:nvSpPr>
+        <p:spPr/>
+        <p:txBody>
+          <a:bodyPr/>
+          <a:lstStyle/>
+          <a:p>
+            <a:r>
+              <a:rPr lang="en-US" dirty="0"/>
+              <a:t>Closing thoughts, confident it would be a good tool, </a:t>
+            </a:r>
+          </a:p>
+          <a:p>
+            <a:r>
+              <a:rPr lang="en-US" dirty="0"/>
+              <a:t>- level of accuracy provides credibility</a:t>
+            </a:r>
+          </a:p>
+        </p:txBody>
+      </p:sp>
+      <p:sp>
+        <p:nvSpPr>
+          <p:cNvPr id="4" name="Slide Number Placeholder 3"/>
+          <p:cNvSpPr>
+            <a:spLocks noGrp="1"/>
+          </p:cNvSpPr>
+          <p:nvPr>
+            <p:ph type="sldNum" sz="quarter" idx="5"/>
+          </p:nvPr>
+        </p:nvSpPr>
+        <p:spPr/>
+        <p:txBody>
+          <a:bodyPr/>
+          <a:lstStyle/>
+          <a:p>
+            <a:fld id="{2F59C3BC-FB11-4182-87E9-62129BAA115E}" type="slidenum">
+              <a:rPr lang="en-US" smtClean="0"/>
+              <a:t>10</a:t>
+            </a:fld>
+            <a:endParaRPr lang="en-US"/>
+          </a:p>
+        </p:txBody>
+      </p:sp>
+    </p:spTree>
+    <p:extLst>
+      <p:ext uri="{BB962C8B-B14F-4D97-AF65-F5344CB8AC3E}">
+        <p14:creationId xmlns:p14="http://schemas.microsoft.com/office/powerpoint/2010/main" val="1946950074"/>
+      </p:ext>
+    </p:extLst>
+  </p:cSld>
+  <p:clrMapOvr>
+    <a:masterClrMapping/>
+  </p:clrMapOvr>
+</p:notes>
 </file>
 
 <file path=ppt/slideLayouts/slideLayout1.xml><?xml version="1.0" encoding="utf-8"?>
@@ -3594,7 +4542,7 @@
             <a:r>
               <a:rPr lang="en-US" sz="1200" dirty="0">
                 <a:solidFill>
-                  <a:srgbClr val="55B5A1"/>
+                  <a:srgbClr val="479385"/>
                 </a:solidFill>
                 <a:latin typeface="Spiegel-Regular" panose="020B0502060402020504" pitchFamily="34" charset="0"/>
                 <a:cs typeface="BeaufortforLOL-Bold" panose="02020803050000020004" pitchFamily="18" charset="0"/>
@@ -3606,7 +4554,7 @@
             <a:r>
               <a:rPr lang="en-US" sz="1200" dirty="0">
                 <a:solidFill>
-                  <a:srgbClr val="55B5A1"/>
+                  <a:srgbClr val="479385"/>
                 </a:solidFill>
                 <a:latin typeface="Spiegel-Regular" panose="020B0502060402020504" pitchFamily="34" charset="0"/>
                 <a:cs typeface="BeaufortforLOL-Bold" panose="02020803050000020004" pitchFamily="18" charset="0"/>
@@ -3618,7 +4566,7 @@
             <a:r>
               <a:rPr lang="en-US" sz="1200" dirty="0">
                 <a:solidFill>
-                  <a:srgbClr val="55B5A1"/>
+                  <a:srgbClr val="479385"/>
                 </a:solidFill>
                 <a:latin typeface="Spiegel-Regular" panose="020B0502060402020504" pitchFamily="34" charset="0"/>
                 <a:cs typeface="BeaufortforLOL-Bold" panose="02020803050000020004" pitchFamily="18" charset="0"/>
@@ -3630,7 +4578,7 @@
             <a:r>
               <a:rPr lang="en-US" sz="1200" dirty="0">
                 <a:solidFill>
-                  <a:srgbClr val="55B5A1"/>
+                  <a:srgbClr val="479385"/>
                 </a:solidFill>
                 <a:latin typeface="Spiegel-Regular" panose="020B0502060402020504" pitchFamily="34" charset="0"/>
                 <a:cs typeface="BeaufortforLOL-Bold" panose="02020803050000020004" pitchFamily="18" charset="0"/>
@@ -3739,7 +4687,7 @@
           <p:nvPr/>
         </p:nvPicPr>
         <p:blipFill>
-          <a:blip r:embed="rId2">
+          <a:blip r:embed="rId3">
             <a:extLst>
               <a:ext uri="{28A0092B-C50C-407E-A947-70E740481C1C}">
                 <a14:useLocalDpi xmlns:a14="http://schemas.microsoft.com/office/drawing/2010/main" val="0"/>
@@ -3977,8 +4925,8 @@
         </p:nvSpPr>
         <p:spPr>
           <a:xfrm>
-            <a:off x="9401524" y="1357129"/>
-            <a:ext cx="2122476" cy="1384995"/>
+            <a:off x="9401523" y="1357129"/>
+            <a:ext cx="2517207" cy="1815882"/>
           </a:xfrm>
           <a:prstGeom prst="rect">
             <a:avLst/>
@@ -3998,7 +4946,7 @@
                 </a:solidFill>
                 <a:latin typeface="Spiegel-Regular" panose="020B0502060402020504" pitchFamily="34" charset="0"/>
               </a:rPr>
-              <a:t>We are confident this tool can be used by e-sports casters in assessing games</a:t>
+              <a:t>We are confident this tool can be used by e-sports casters in assessing games, with any level of inaccuracy allowing for interesting discussion by casters</a:t>
             </a:r>
           </a:p>
           <a:p>
@@ -4034,7 +4982,7 @@
           <p:nvPr/>
         </p:nvPicPr>
         <p:blipFill>
-          <a:blip r:embed="rId3">
+          <a:blip r:embed="rId4">
             <a:extLst>
               <a:ext uri="{28A0092B-C50C-407E-A947-70E740481C1C}">
                 <a14:useLocalDpi xmlns:a14="http://schemas.microsoft.com/office/drawing/2010/main" val="0"/>
@@ -4154,7 +5102,7 @@
         </p:nvSpPr>
         <p:spPr>
           <a:xfrm>
-            <a:off x="9401524" y="2856113"/>
+            <a:off x="9401524" y="2966474"/>
             <a:ext cx="2714276" cy="389087"/>
           </a:xfrm>
           <a:prstGeom prst="rect">
@@ -4212,7 +5160,7 @@
         </p:nvSpPr>
         <p:spPr>
           <a:xfrm>
-            <a:off x="9401523" y="3429000"/>
+            <a:off x="9401523" y="3539361"/>
             <a:ext cx="2714275" cy="2462213"/>
           </a:xfrm>
           <a:prstGeom prst="rect">
@@ -4825,7 +5773,7 @@
         </p:nvSpPr>
         <p:spPr>
           <a:xfrm>
-            <a:off x="2532475" y="2833306"/>
+            <a:off x="2529448" y="2208756"/>
             <a:ext cx="3882307" cy="1047887"/>
           </a:xfrm>
           <a:prstGeom prst="rect">
@@ -7017,10 +7965,10 @@
       </p:cxnSp>
       <p:pic>
         <p:nvPicPr>
-          <p:cNvPr id="11" name="Picture 10">
-            <a:extLst>
-              <a:ext uri="{FF2B5EF4-FFF2-40B4-BE49-F238E27FC236}">
-                <a16:creationId xmlns:a16="http://schemas.microsoft.com/office/drawing/2014/main" id="{84A27AF5-3CF8-4AB3-8ADB-DFA51CA9A31F}"/>
+          <p:cNvPr id="3" name="Picture 2">
+            <a:extLst>
+              <a:ext uri="{FF2B5EF4-FFF2-40B4-BE49-F238E27FC236}">
+                <a16:creationId xmlns:a16="http://schemas.microsoft.com/office/drawing/2014/main" id="{8ABF1ED5-CFAA-44B5-B979-2E4B08E10F9B}"/>
               </a:ext>
             </a:extLst>
           </p:cNvPr>
@@ -7043,14 +7991,81 @@
         </p:blipFill>
         <p:spPr>
           <a:xfrm>
-            <a:off x="983309" y="903304"/>
-            <a:ext cx="8161063" cy="5051391"/>
+            <a:off x="277462" y="335395"/>
+            <a:ext cx="8614290" cy="5825605"/>
           </a:xfrm>
           <a:prstGeom prst="rect">
             <a:avLst/>
           </a:prstGeom>
         </p:spPr>
       </p:pic>
+      <p:sp>
+        <p:nvSpPr>
+          <p:cNvPr id="13" name="TextBox 12">
+            <a:extLst>
+              <a:ext uri="{FF2B5EF4-FFF2-40B4-BE49-F238E27FC236}">
+                <a16:creationId xmlns:a16="http://schemas.microsoft.com/office/drawing/2014/main" id="{DD13F8A2-4F2D-4D3E-B91D-B0C72590552E}"/>
+              </a:ext>
+            </a:extLst>
+          </p:cNvPr>
+          <p:cNvSpPr txBox="1"/>
+          <p:nvPr/>
+        </p:nvSpPr>
+        <p:spPr>
+          <a:xfrm>
+            <a:off x="9124064" y="1167943"/>
+            <a:ext cx="2517207" cy="400110"/>
+          </a:xfrm>
+          <a:prstGeom prst="rect">
+            <a:avLst/>
+          </a:prstGeom>
+          <a:noFill/>
+        </p:spPr>
+        <p:txBody>
+          <a:bodyPr wrap="square" rtlCol="0">
+            <a:spAutoFit/>
+          </a:bodyPr>
+          <a:lstStyle/>
+          <a:p>
+            <a:r>
+              <a:rPr lang="en-US" sz="2000" b="1" dirty="0" err="1">
+                <a:solidFill>
+                  <a:srgbClr val="3A796D"/>
+                </a:solidFill>
+                <a:latin typeface="Spiegel-Regular" panose="020B0502060402020504" pitchFamily="34" charset="0"/>
+              </a:rPr>
+              <a:t>Lin_reg</a:t>
+            </a:r>
+            <a:r>
+              <a:rPr lang="en-US" sz="2000" b="1" dirty="0">
+                <a:solidFill>
+                  <a:srgbClr val="3A796D"/>
+                </a:solidFill>
+                <a:latin typeface="Spiegel-Regular" panose="020B0502060402020504" pitchFamily="34" charset="0"/>
+              </a:rPr>
+              <a:t> </a:t>
+            </a:r>
+            <a:r>
+              <a:rPr lang="en-US" sz="2000" b="1" dirty="0" err="1">
+                <a:solidFill>
+                  <a:srgbClr val="3A796D"/>
+                </a:solidFill>
+                <a:latin typeface="Spiegel-Regular" panose="020B0502060402020504" pitchFamily="34" charset="0"/>
+              </a:rPr>
+              <a:t>coef</a:t>
+            </a:r>
+            <a:r>
+              <a:rPr lang="en-US" sz="2000" b="1" dirty="0">
+                <a:solidFill>
+                  <a:srgbClr val="3A796D"/>
+                </a:solidFill>
+                <a:latin typeface="Spiegel-Regular" panose="020B0502060402020504" pitchFamily="34" charset="0"/>
+              </a:rPr>
+              <a:t> = .5088</a:t>
+            </a:r>
+          </a:p>
+        </p:txBody>
+      </p:sp>
     </p:spTree>
     <p:extLst>
       <p:ext uri="{BB962C8B-B14F-4D97-AF65-F5344CB8AC3E}">
@@ -7438,7 +8453,7 @@
           <p:nvPr/>
         </p:nvPicPr>
         <p:blipFill>
-          <a:blip r:embed="rId2">
+          <a:blip r:embed="rId3">
             <a:extLst>
               <a:ext uri="{28A0092B-C50C-407E-A947-70E740481C1C}">
                 <a14:useLocalDpi xmlns:a14="http://schemas.microsoft.com/office/drawing/2010/main" val="0"/>
@@ -7605,25 +8620,7 @@
                 </a:solidFill>
                 <a:latin typeface="Spiegel-Regular" panose="020B0502060402020504" pitchFamily="34" charset="0"/>
               </a:rPr>
-              <a:t>~115 million </a:t>
-            </a:r>
-            <a:r>
-              <a:rPr lang="en-US" sz="1600" dirty="0">
-                <a:solidFill>
-                  <a:srgbClr val="3A796D"/>
-                </a:solidFill>
-                <a:latin typeface="Spiegel-Regular" panose="020B0502060402020504" pitchFamily="34" charset="0"/>
-              </a:rPr>
-              <a:t>players</a:t>
-            </a:r>
-            <a:r>
-              <a:rPr lang="en-US" sz="1600" b="1" dirty="0">
-                <a:solidFill>
-                  <a:srgbClr val="3A796D"/>
-                </a:solidFill>
-                <a:latin typeface="Spiegel-Regular" panose="020B0502060402020504" pitchFamily="34" charset="0"/>
-              </a:rPr>
-              <a:t> </a:t>
+              <a:t>~115 million players </a:t>
             </a:r>
             <a:r>
               <a:rPr lang="en-US" sz="1600" dirty="0">
@@ -7641,23 +8638,8 @@
                 </a:solidFill>
                 <a:latin typeface="Spiegel-Regular" panose="020B0502060402020504" pitchFamily="34" charset="0"/>
               </a:rPr>
-              <a:t>2 million</a:t>
-            </a:r>
-            <a:r>
-              <a:rPr lang="en-US" sz="1600" dirty="0">
-                <a:solidFill>
-                  <a:srgbClr val="3A796D"/>
-                </a:solidFill>
-                <a:latin typeface="Spiegel-Regular" panose="020B0502060402020504" pitchFamily="34" charset="0"/>
-              </a:rPr>
-              <a:t> players</a:t>
-            </a:r>
-            <a:endParaRPr lang="en-US" sz="1600" b="1" dirty="0">
-              <a:solidFill>
-                <a:srgbClr val="3A796D"/>
-              </a:solidFill>
-              <a:latin typeface="Spiegel-Regular" panose="020B0502060402020504" pitchFamily="34" charset="0"/>
-            </a:endParaRPr>
+              <a:t>2 million players</a:t>
+            </a:r>
           </a:p>
           <a:p>
             <a:endParaRPr lang="en-US" sz="1400" dirty="0">
@@ -7765,32 +8747,8 @@
                 </a:solidFill>
                 <a:latin typeface="Spiegel-Regular" panose="020B0502060402020504" pitchFamily="34" charset="0"/>
               </a:rPr>
-              <a:t>As an e-sport, League of Legends has shown immense growth over the past decade, with the 2020 League of Legends World Championship finals reaching a peak concurrent viewership of </a:t>
-            </a:r>
-            <a:r>
-              <a:rPr lang="en-US" sz="1600" b="1" dirty="0">
-                <a:solidFill>
-                  <a:srgbClr val="3A796D"/>
-                </a:solidFill>
-                <a:latin typeface="Spiegel-Regular" panose="020B0502060402020504" pitchFamily="34" charset="0"/>
-              </a:rPr>
-              <a:t>49.5 million </a:t>
-            </a:r>
-            <a:r>
-              <a:rPr lang="en-US" sz="1600" dirty="0">
-                <a:solidFill>
-                  <a:srgbClr val="3A796D"/>
-                </a:solidFill>
-                <a:latin typeface="Spiegel-Regular" panose="020B0502060402020504" pitchFamily="34" charset="0"/>
-              </a:rPr>
-              <a:t>viewers</a:t>
-            </a:r>
-            <a:endParaRPr lang="en-US" sz="1600" b="1" dirty="0">
-              <a:solidFill>
-                <a:srgbClr val="3A796D"/>
-              </a:solidFill>
-              <a:latin typeface="Spiegel-Regular" panose="020B0502060402020504" pitchFamily="34" charset="0"/>
-            </a:endParaRPr>
+              <a:t>As an e-sport, League of Legends has shown immense growth over the past decade, with the 2020 League of Legends World Championship finals reaching a peak concurrent viewership of 49.5 million viewers</a:t>
+            </a:r>
           </a:p>
           <a:p>
             <a:endParaRPr lang="en-US" sz="1400" dirty="0">
@@ -8062,7 +9020,7 @@
           <p:nvPr/>
         </p:nvPicPr>
         <p:blipFill>
-          <a:blip r:embed="rId2">
+          <a:blip r:embed="rId3">
             <a:extLst>
               <a:ext uri="{28A0092B-C50C-407E-A947-70E740481C1C}">
                 <a14:useLocalDpi xmlns:a14="http://schemas.microsoft.com/office/drawing/2010/main" val="0"/>
@@ -8242,7 +9200,7 @@
           <p:nvPr/>
         </p:nvPicPr>
         <p:blipFill>
-          <a:blip r:embed="rId2">
+          <a:blip r:embed="rId3">
             <a:extLst>
               <a:ext uri="{28A0092B-C50C-407E-A947-70E740481C1C}">
                 <a14:useLocalDpi xmlns:a14="http://schemas.microsoft.com/office/drawing/2010/main" val="0"/>
@@ -8689,7 +9647,7 @@
           <p:nvPr/>
         </p:nvPicPr>
         <p:blipFill>
-          <a:blip r:embed="rId3">
+          <a:blip r:embed="rId4">
             <a:extLst>
               <a:ext uri="{28A0092B-C50C-407E-A947-70E740481C1C}">
                 <a14:useLocalDpi xmlns:a14="http://schemas.microsoft.com/office/drawing/2010/main" val="0"/>
@@ -9192,7 +10150,7 @@
           <p:nvPr/>
         </p:nvPicPr>
         <p:blipFill>
-          <a:blip r:embed="rId2">
+          <a:blip r:embed="rId3">
             <a:extLst>
               <a:ext uri="{28A0092B-C50C-407E-A947-70E740481C1C}">
                 <a14:useLocalDpi xmlns:a14="http://schemas.microsoft.com/office/drawing/2010/main" val="0"/>
@@ -9311,7 +10269,7 @@
           <p:nvPr/>
         </p:nvPicPr>
         <p:blipFill>
-          <a:blip r:embed="rId3">
+          <a:blip r:embed="rId4">
             <a:extLst>
               <a:ext uri="{28A0092B-C50C-407E-A947-70E740481C1C}">
                 <a14:useLocalDpi xmlns:a14="http://schemas.microsoft.com/office/drawing/2010/main" val="0"/>
@@ -9332,6 +10290,102 @@
           </a:prstGeom>
         </p:spPr>
       </p:pic>
+      <p:pic>
+        <p:nvPicPr>
+          <p:cNvPr id="11" name="Picture 10">
+            <a:extLst>
+              <a:ext uri="{FF2B5EF4-FFF2-40B4-BE49-F238E27FC236}">
+                <a16:creationId xmlns:a16="http://schemas.microsoft.com/office/drawing/2014/main" id="{76CF1D25-5415-4ADF-835F-F2A1C02111A0}"/>
+              </a:ext>
+            </a:extLst>
+          </p:cNvPr>
+          <p:cNvPicPr>
+            <a:picLocks noChangeAspect="1"/>
+          </p:cNvPicPr>
+          <p:nvPr/>
+        </p:nvPicPr>
+        <p:blipFill>
+          <a:blip r:embed="rId5">
+            <a:extLst>
+              <a:ext uri="{28A0092B-C50C-407E-A947-70E740481C1C}">
+                <a14:useLocalDpi xmlns:a14="http://schemas.microsoft.com/office/drawing/2010/main" val="0"/>
+              </a:ext>
+            </a:extLst>
+          </a:blip>
+          <a:stretch>
+            <a:fillRect/>
+          </a:stretch>
+        </p:blipFill>
+        <p:spPr>
+          <a:xfrm>
+            <a:off x="174187" y="453129"/>
+            <a:ext cx="8592558" cy="5932078"/>
+          </a:xfrm>
+          <a:prstGeom prst="rect">
+            <a:avLst/>
+          </a:prstGeom>
+        </p:spPr>
+      </p:pic>
+      <p:sp>
+        <p:nvSpPr>
+          <p:cNvPr id="14" name="Title 1">
+            <a:extLst>
+              <a:ext uri="{FF2B5EF4-FFF2-40B4-BE49-F238E27FC236}">
+                <a16:creationId xmlns:a16="http://schemas.microsoft.com/office/drawing/2014/main" id="{0279923E-820C-4C3D-B126-66F6837C4307}"/>
+              </a:ext>
+            </a:extLst>
+          </p:cNvPr>
+          <p:cNvSpPr txBox="1">
+            <a:spLocks/>
+          </p:cNvSpPr>
+          <p:nvPr/>
+        </p:nvSpPr>
+        <p:spPr>
+          <a:xfrm>
+            <a:off x="3726811" y="98939"/>
+            <a:ext cx="1940392" cy="389087"/>
+          </a:xfrm>
+          <a:prstGeom prst="rect">
+            <a:avLst/>
+          </a:prstGeom>
+        </p:spPr>
+        <p:txBody>
+          <a:bodyPr vert="horz" lIns="91440" tIns="45720" rIns="91440" bIns="45720" rtlCol="0" anchor="ctr">
+            <a:normAutofit fontScale="97500"/>
+          </a:bodyPr>
+          <a:lstStyle>
+            <a:lvl1pPr algn="l" defTabSz="914400" rtl="0" eaLnBrk="1" latinLnBrk="0" hangingPunct="1">
+              <a:lnSpc>
+                <a:spcPct val="90000"/>
+              </a:lnSpc>
+              <a:spcBef>
+                <a:spcPct val="0"/>
+              </a:spcBef>
+              <a:buNone/>
+              <a:defRPr sz="4400" kern="1200">
+                <a:solidFill>
+                  <a:schemeClr val="tx1"/>
+                </a:solidFill>
+                <a:latin typeface="+mj-lt"/>
+                <a:ea typeface="+mj-ea"/>
+                <a:cs typeface="+mj-cs"/>
+              </a:defRPr>
+            </a:lvl1pPr>
+          </a:lstStyle>
+          <a:p>
+            <a:r>
+              <a:rPr lang="en-US" sz="1800" b="1" dirty="0">
+                <a:solidFill>
+                  <a:srgbClr val="55B5A1"/>
+                </a:solidFill>
+                <a:latin typeface="BeaufortforLOL-Regular" panose="02020503050000020004" pitchFamily="18" charset="0"/>
+                <a:cs typeface="BeaufortforLOL-Regular" panose="02020503050000020004" pitchFamily="18" charset="0"/>
+              </a:rPr>
+              <a:t>ROC Curve</a:t>
+            </a:r>
+          </a:p>
+        </p:txBody>
+      </p:sp>
     </p:spTree>
     <p:extLst>
       <p:ext uri="{BB962C8B-B14F-4D97-AF65-F5344CB8AC3E}">
@@ -9826,12 +10880,72 @@
           </a:fontRef>
         </p:style>
       </p:cxnSp>
+      <p:sp>
+        <p:nvSpPr>
+          <p:cNvPr id="14" name="Title 1">
+            <a:extLst>
+              <a:ext uri="{FF2B5EF4-FFF2-40B4-BE49-F238E27FC236}">
+                <a16:creationId xmlns:a16="http://schemas.microsoft.com/office/drawing/2014/main" id="{0BDE1D96-5705-460B-AFA6-764921AA7654}"/>
+              </a:ext>
+            </a:extLst>
+          </p:cNvPr>
+          <p:cNvSpPr txBox="1">
+            <a:spLocks/>
+          </p:cNvSpPr>
+          <p:nvPr/>
+        </p:nvSpPr>
+        <p:spPr>
+          <a:xfrm>
+            <a:off x="3516416" y="261368"/>
+            <a:ext cx="1940392" cy="389087"/>
+          </a:xfrm>
+          <a:prstGeom prst="rect">
+            <a:avLst/>
+          </a:prstGeom>
+        </p:spPr>
+        <p:txBody>
+          <a:bodyPr vert="horz" lIns="91440" tIns="45720" rIns="91440" bIns="45720" rtlCol="0" anchor="ctr">
+            <a:normAutofit fontScale="97500"/>
+          </a:bodyPr>
+          <a:lstStyle>
+            <a:lvl1pPr algn="l" defTabSz="914400" rtl="0" eaLnBrk="1" latinLnBrk="0" hangingPunct="1">
+              <a:lnSpc>
+                <a:spcPct val="90000"/>
+              </a:lnSpc>
+              <a:spcBef>
+                <a:spcPct val="0"/>
+              </a:spcBef>
+              <a:buNone/>
+              <a:defRPr sz="4400" kern="1200">
+                <a:solidFill>
+                  <a:schemeClr val="tx1"/>
+                </a:solidFill>
+                <a:latin typeface="+mj-lt"/>
+                <a:ea typeface="+mj-ea"/>
+                <a:cs typeface="+mj-cs"/>
+              </a:defRPr>
+            </a:lvl1pPr>
+          </a:lstStyle>
+          <a:p>
+            <a:r>
+              <a:rPr lang="en-US" sz="1800" b="1" dirty="0">
+                <a:solidFill>
+                  <a:srgbClr val="55B5A1"/>
+                </a:solidFill>
+                <a:latin typeface="BeaufortforLOL-Regular" panose="02020503050000020004" pitchFamily="18" charset="0"/>
+                <a:cs typeface="BeaufortforLOL-Regular" panose="02020503050000020004" pitchFamily="18" charset="0"/>
+              </a:rPr>
+              <a:t>Confusion Matrix</a:t>
+            </a:r>
+          </a:p>
+        </p:txBody>
+      </p:sp>
       <p:pic>
         <p:nvPicPr>
-          <p:cNvPr id="13" name="Picture 12">
-            <a:extLst>
-              <a:ext uri="{FF2B5EF4-FFF2-40B4-BE49-F238E27FC236}">
-                <a16:creationId xmlns:a16="http://schemas.microsoft.com/office/drawing/2014/main" id="{14CD129A-9E05-42DF-A0E7-9E8E367040EC}"/>
+          <p:cNvPr id="11" name="Picture 10">
+            <a:extLst>
+              <a:ext uri="{FF2B5EF4-FFF2-40B4-BE49-F238E27FC236}">
+                <a16:creationId xmlns:a16="http://schemas.microsoft.com/office/drawing/2014/main" id="{6D4A7C36-AF42-460D-824A-90CA2E7EA249}"/>
               </a:ext>
             </a:extLst>
           </p:cNvPr>
@@ -9854,8 +10968,8 @@
         </p:blipFill>
         <p:spPr>
           <a:xfrm>
-            <a:off x="1112160" y="610178"/>
-            <a:ext cx="6617354" cy="5374795"/>
+            <a:off x="1280907" y="618061"/>
+            <a:ext cx="6868618" cy="5938438"/>
           </a:xfrm>
           <a:prstGeom prst="rect">
             <a:avLst/>
@@ -10220,6 +11334,12 @@
               </a:rPr>
               <a:t>False negatives had a mean predicted probability of ~34%</a:t>
             </a:r>
+            <a:endParaRPr lang="en-US" sz="1400" dirty="0">
+              <a:solidFill>
+                <a:srgbClr val="C89B38"/>
+              </a:solidFill>
+              <a:latin typeface="Spiegel-Regular" panose="020B0502060402020504" pitchFamily="34" charset="0"/>
+            </a:endParaRPr>
           </a:p>
           <a:p>
             <a:pPr marL="285750" indent="-285750">
@@ -10258,7 +11378,7 @@
           <p:nvPr/>
         </p:nvPicPr>
         <p:blipFill>
-          <a:blip r:embed="rId2">
+          <a:blip r:embed="rId3">
             <a:extLst>
               <a:ext uri="{28A0092B-C50C-407E-A947-70E740481C1C}">
                 <a14:useLocalDpi xmlns:a14="http://schemas.microsoft.com/office/drawing/2010/main" val="0"/>
@@ -10377,7 +11497,7 @@
           <p:nvPr/>
         </p:nvPicPr>
         <p:blipFill>
-          <a:blip r:embed="rId3">
+          <a:blip r:embed="rId4">
             <a:extLst>
               <a:ext uri="{28A0092B-C50C-407E-A947-70E740481C1C}">
                 <a14:useLocalDpi xmlns:a14="http://schemas.microsoft.com/office/drawing/2010/main" val="0"/>
@@ -10938,4 +12058,299 @@
     </a:ext>
   </a:extLst>
 </a:theme>
+</file>
+
+<file path=ppt/theme/theme2.xml><?xml version="1.0" encoding="utf-8"?>
+<a:theme xmlns:a="http://schemas.openxmlformats.org/drawingml/2006/main" name="Office Theme">
+  <a:themeElements>
+    <a:clrScheme name="Office">
+      <a:dk1>
+        <a:sysClr val="windowText" lastClr="000000"/>
+      </a:dk1>
+      <a:lt1>
+        <a:sysClr val="window" lastClr="FFFFFF"/>
+      </a:lt1>
+      <a:dk2>
+        <a:srgbClr val="44546A"/>
+      </a:dk2>
+      <a:lt2>
+        <a:srgbClr val="E7E6E6"/>
+      </a:lt2>
+      <a:accent1>
+        <a:srgbClr val="4472C4"/>
+      </a:accent1>
+      <a:accent2>
+        <a:srgbClr val="ED7D31"/>
+      </a:accent2>
+      <a:accent3>
+        <a:srgbClr val="A5A5A5"/>
+      </a:accent3>
+      <a:accent4>
+        <a:srgbClr val="FFC000"/>
+      </a:accent4>
+      <a:accent5>
+        <a:srgbClr val="5B9BD5"/>
+      </a:accent5>
+      <a:accent6>
+        <a:srgbClr val="70AD47"/>
+      </a:accent6>
+      <a:hlink>
+        <a:srgbClr val="0563C1"/>
+      </a:hlink>
+      <a:folHlink>
+        <a:srgbClr val="954F72"/>
+      </a:folHlink>
+    </a:clrScheme>
+    <a:fontScheme name="Office">
+      <a:majorFont>
+        <a:latin typeface="Calibri Light" panose="020F0302020204030204"/>
+        <a:ea typeface=""/>
+        <a:cs typeface=""/>
+        <a:font script="Jpan" typeface="游ゴシック Light"/>
+        <a:font script="Hang" typeface="맑은 고딕"/>
+        <a:font script="Hans" typeface="等线 Light"/>
+        <a:font script="Hant" typeface="新細明體"/>
+        <a:font script="Arab" typeface="Times New Roman"/>
+        <a:font script="Hebr" typeface="Times New Roman"/>
+        <a:font script="Thai" typeface="Angsana New"/>
+        <a:font script="Ethi" typeface="Nyala"/>
+        <a:font script="Beng" typeface="Vrinda"/>
+        <a:font script="Gujr" typeface="Shruti"/>
+        <a:font script="Khmr" typeface="MoolBoran"/>
+        <a:font script="Knda" typeface="Tunga"/>
+        <a:font script="Guru" typeface="Raavi"/>
+        <a:font script="Cans" typeface="Euphemia"/>
+        <a:font script="Cher" typeface="Plantagenet Cherokee"/>
+        <a:font script="Yiii" typeface="Microsoft Yi Baiti"/>
+        <a:font script="Tibt" typeface="Microsoft Himalaya"/>
+        <a:font script="Thaa" typeface="MV Boli"/>
+        <a:font script="Deva" typeface="Mangal"/>
+        <a:font script="Telu" typeface="Gautami"/>
+        <a:font script="Taml" typeface="Latha"/>
+        <a:font script="Syrc" typeface="Estrangelo Edessa"/>
+        <a:font script="Orya" typeface="Kalinga"/>
+        <a:font script="Mlym" typeface="Kartika"/>
+        <a:font script="Laoo" typeface="DokChampa"/>
+        <a:font script="Sinh" typeface="Iskoola Pota"/>
+        <a:font script="Mong" typeface="Mongolian Baiti"/>
+        <a:font script="Viet" typeface="Times New Roman"/>
+        <a:font script="Uigh" typeface="Microsoft Uighur"/>
+        <a:font script="Geor" typeface="Sylfaen"/>
+        <a:font script="Armn" typeface="Arial"/>
+        <a:font script="Bugi" typeface="Leelawadee UI"/>
+        <a:font script="Bopo" typeface="Microsoft JhengHei"/>
+        <a:font script="Java" typeface="Javanese Text"/>
+        <a:font script="Lisu" typeface="Segoe UI"/>
+        <a:font script="Mymr" typeface="Myanmar Text"/>
+        <a:font script="Nkoo" typeface="Ebrima"/>
+        <a:font script="Olck" typeface="Nirmala UI"/>
+        <a:font script="Osma" typeface="Ebrima"/>
+        <a:font script="Phag" typeface="Phagspa"/>
+        <a:font script="Syrn" typeface="Estrangelo Edessa"/>
+        <a:font script="Syrj" typeface="Estrangelo Edessa"/>
+        <a:font script="Syre" typeface="Estrangelo Edessa"/>
+        <a:font script="Sora" typeface="Nirmala UI"/>
+        <a:font script="Tale" typeface="Microsoft Tai Le"/>
+        <a:font script="Talu" typeface="Microsoft New Tai Lue"/>
+        <a:font script="Tfng" typeface="Ebrima"/>
+      </a:majorFont>
+      <a:minorFont>
+        <a:latin typeface="Calibri" panose="020F0502020204030204"/>
+        <a:ea typeface=""/>
+        <a:cs typeface=""/>
+        <a:font script="Jpan" typeface="游ゴシック"/>
+        <a:font script="Hang" typeface="맑은 고딕"/>
+        <a:font script="Hans" typeface="等线"/>
+        <a:font script="Hant" typeface="新細明體"/>
+        <a:font script="Arab" typeface="Arial"/>
+        <a:font script="Hebr" typeface="Arial"/>
+        <a:font script="Thai" typeface="Cordia New"/>
+        <a:font script="Ethi" typeface="Nyala"/>
+        <a:font script="Beng" typeface="Vrinda"/>
+        <a:font script="Gujr" typeface="Shruti"/>
+        <a:font script="Khmr" typeface="DaunPenh"/>
+        <a:font script="Knda" typeface="Tunga"/>
+        <a:font script="Guru" typeface="Raavi"/>
+        <a:font script="Cans" typeface="Euphemia"/>
+        <a:font script="Cher" typeface="Plantagenet Cherokee"/>
+        <a:font script="Yiii" typeface="Microsoft Yi Baiti"/>
+        <a:font script="Tibt" typeface="Microsoft Himalaya"/>
+        <a:font script="Thaa" typeface="MV Boli"/>
+        <a:font script="Deva" typeface="Mangal"/>
+        <a:font script="Telu" typeface="Gautami"/>
+        <a:font script="Taml" typeface="Latha"/>
+        <a:font script="Syrc" typeface="Estrangelo Edessa"/>
+        <a:font script="Orya" typeface="Kalinga"/>
+        <a:font script="Mlym" typeface="Kartika"/>
+        <a:font script="Laoo" typeface="DokChampa"/>
+        <a:font script="Sinh" typeface="Iskoola Pota"/>
+        <a:font script="Mong" typeface="Mongolian Baiti"/>
+        <a:font script="Viet" typeface="Arial"/>
+        <a:font script="Uigh" typeface="Microsoft Uighur"/>
+        <a:font script="Geor" typeface="Sylfaen"/>
+        <a:font script="Armn" typeface="Arial"/>
+        <a:font script="Bugi" typeface="Leelawadee UI"/>
+        <a:font script="Bopo" typeface="Microsoft JhengHei"/>
+        <a:font script="Java" typeface="Javanese Text"/>
+        <a:font script="Lisu" typeface="Segoe UI"/>
+        <a:font script="Mymr" typeface="Myanmar Text"/>
+        <a:font script="Nkoo" typeface="Ebrima"/>
+        <a:font script="Olck" typeface="Nirmala UI"/>
+        <a:font script="Osma" typeface="Ebrima"/>
+        <a:font script="Phag" typeface="Phagspa"/>
+        <a:font script="Syrn" typeface="Estrangelo Edessa"/>
+        <a:font script="Syrj" typeface="Estrangelo Edessa"/>
+        <a:font script="Syre" typeface="Estrangelo Edessa"/>
+        <a:font script="Sora" typeface="Nirmala UI"/>
+        <a:font script="Tale" typeface="Microsoft Tai Le"/>
+        <a:font script="Talu" typeface="Microsoft New Tai Lue"/>
+        <a:font script="Tfng" typeface="Ebrima"/>
+      </a:minorFont>
+    </a:fontScheme>
+    <a:fmtScheme name="Office">
+      <a:fillStyleLst>
+        <a:solidFill>
+          <a:schemeClr val="phClr"/>
+        </a:solidFill>
+        <a:gradFill rotWithShape="1">
+          <a:gsLst>
+            <a:gs pos="0">
+              <a:schemeClr val="phClr">
+                <a:lumMod val="110000"/>
+                <a:satMod val="105000"/>
+                <a:tint val="67000"/>
+              </a:schemeClr>
+            </a:gs>
+            <a:gs pos="50000">
+              <a:schemeClr val="phClr">
+                <a:lumMod val="105000"/>
+                <a:satMod val="103000"/>
+                <a:tint val="73000"/>
+              </a:schemeClr>
+            </a:gs>
+            <a:gs pos="100000">
+              <a:schemeClr val="phClr">
+                <a:lumMod val="105000"/>
+                <a:satMod val="109000"/>
+                <a:tint val="81000"/>
+              </a:schemeClr>
+            </a:gs>
+          </a:gsLst>
+          <a:lin ang="5400000" scaled="0"/>
+        </a:gradFill>
+        <a:gradFill rotWithShape="1">
+          <a:gsLst>
+            <a:gs pos="0">
+              <a:schemeClr val="phClr">
+                <a:satMod val="103000"/>
+                <a:lumMod val="102000"/>
+                <a:tint val="94000"/>
+              </a:schemeClr>
+            </a:gs>
+            <a:gs pos="50000">
+              <a:schemeClr val="phClr">
+                <a:satMod val="110000"/>
+                <a:lumMod val="100000"/>
+                <a:shade val="100000"/>
+              </a:schemeClr>
+            </a:gs>
+            <a:gs pos="100000">
+              <a:schemeClr val="phClr">
+                <a:lumMod val="99000"/>
+                <a:satMod val="120000"/>
+                <a:shade val="78000"/>
+              </a:schemeClr>
+            </a:gs>
+          </a:gsLst>
+          <a:lin ang="5400000" scaled="0"/>
+        </a:gradFill>
+      </a:fillStyleLst>
+      <a:lnStyleLst>
+        <a:ln w="6350" cap="flat" cmpd="sng" algn="ctr">
+          <a:solidFill>
+            <a:schemeClr val="phClr"/>
+          </a:solidFill>
+          <a:prstDash val="solid"/>
+          <a:miter lim="800000"/>
+        </a:ln>
+        <a:ln w="12700" cap="flat" cmpd="sng" algn="ctr">
+          <a:solidFill>
+            <a:schemeClr val="phClr"/>
+          </a:solidFill>
+          <a:prstDash val="solid"/>
+          <a:miter lim="800000"/>
+        </a:ln>
+        <a:ln w="19050" cap="flat" cmpd="sng" algn="ctr">
+          <a:solidFill>
+            <a:schemeClr val="phClr"/>
+          </a:solidFill>
+          <a:prstDash val="solid"/>
+          <a:miter lim="800000"/>
+        </a:ln>
+      </a:lnStyleLst>
+      <a:effectStyleLst>
+        <a:effectStyle>
+          <a:effectLst/>
+        </a:effectStyle>
+        <a:effectStyle>
+          <a:effectLst/>
+        </a:effectStyle>
+        <a:effectStyle>
+          <a:effectLst>
+            <a:outerShdw blurRad="57150" dist="19050" dir="5400000" algn="ctr" rotWithShape="0">
+              <a:srgbClr val="000000">
+                <a:alpha val="63000"/>
+              </a:srgbClr>
+            </a:outerShdw>
+          </a:effectLst>
+        </a:effectStyle>
+      </a:effectStyleLst>
+      <a:bgFillStyleLst>
+        <a:solidFill>
+          <a:schemeClr val="phClr"/>
+        </a:solidFill>
+        <a:solidFill>
+          <a:schemeClr val="phClr">
+            <a:tint val="95000"/>
+            <a:satMod val="170000"/>
+          </a:schemeClr>
+        </a:solidFill>
+        <a:gradFill rotWithShape="1">
+          <a:gsLst>
+            <a:gs pos="0">
+              <a:schemeClr val="phClr">
+                <a:tint val="93000"/>
+                <a:satMod val="150000"/>
+                <a:shade val="98000"/>
+                <a:lumMod val="102000"/>
+              </a:schemeClr>
+            </a:gs>
+            <a:gs pos="50000">
+              <a:schemeClr val="phClr">
+                <a:tint val="98000"/>
+                <a:satMod val="130000"/>
+                <a:shade val="90000"/>
+                <a:lumMod val="103000"/>
+              </a:schemeClr>
+            </a:gs>
+            <a:gs pos="100000">
+              <a:schemeClr val="phClr">
+                <a:shade val="63000"/>
+                <a:satMod val="120000"/>
+              </a:schemeClr>
+            </a:gs>
+          </a:gsLst>
+          <a:lin ang="5400000" scaled="0"/>
+        </a:gradFill>
+      </a:bgFillStyleLst>
+    </a:fmtScheme>
+  </a:themeElements>
+  <a:objectDefaults/>
+  <a:extraClrSchemeLst/>
+  <a:extLst>
+    <a:ext uri="{05A4C25C-085E-4340-85A3-A5531E510DB2}">
+      <thm15:themeFamily xmlns:thm15="http://schemas.microsoft.com/office/thememl/2012/main" name="Office Theme" id="{62F939B6-93AF-4DB8-9C6B-D6C7DFDC589F}" vid="{4A3C46E8-61CC-4603-A589-7422A47A8E4A}"/>
+    </a:ext>
+  </a:extLst>
+</a:theme>
 </file>
</xml_diff>